<commit_message>
Revised first two lectures, combined slides
My original contribution of slides to "first_program" included two separate PowerPoints (because I had written them for a 50-minute class), but it makes more sense for them to be a single longer PowerPoint. Also fixed a few minor things in the notes.
</commit_message>
<xml_diff>
--- a/lectures/010_general_concepts/Programming-Intro.pptx
+++ b/lectures/010_general_concepts/Programming-Intro.pptx
@@ -5,10 +5,10 @@
     <p:sldMasterId id="2147483732" r:id="rId1"/>
   </p:sldMasterIdLst>
   <p:notesMasterIdLst>
-    <p:notesMasterId r:id="rId25"/>
+    <p:notesMasterId r:id="rId24"/>
   </p:notesMasterIdLst>
   <p:handoutMasterIdLst>
-    <p:handoutMasterId r:id="rId26"/>
+    <p:handoutMasterId r:id="rId25"/>
   </p:handoutMasterIdLst>
   <p:sldIdLst>
     <p:sldId id="256" r:id="rId2"/>
@@ -33,7 +33,6 @@
     <p:sldId id="300" r:id="rId21"/>
     <p:sldId id="301" r:id="rId22"/>
     <p:sldId id="302" r:id="rId23"/>
-    <p:sldId id="303" r:id="rId24"/>
   </p:sldIdLst>
   <p:sldSz cx="12188825" cy="6858000"/>
   <p:notesSz cx="6858000" cy="9144000"/>
@@ -2264,7 +2263,7 @@
           <a:p>
             <a:fld id="{2507D560-C4D4-4804-8CBF-2C56AB6C6DB9}" type="datetimeFigureOut">
               <a:rPr lang="en-US" smtClean="0"/>
-              <a:t>5/17/2021</a:t>
+              <a:t>8/11/2021</a:t>
             </a:fld>
             <a:endParaRPr lang="en-US"/>
           </a:p>
@@ -2429,7 +2428,7 @@
           <a:p>
             <a:fld id="{688E7586-9A7B-41FF-B169-85DADA744493}" type="datetimeFigureOut">
               <a:rPr lang="en-US" smtClean="0"/>
-              <a:t>5/17/2021</a:t>
+              <a:t>8/11/2021</a:t>
             </a:fld>
             <a:endParaRPr lang="en-US"/>
           </a:p>
@@ -6053,8 +6052,8 @@
           </a:p>
           <a:p>
             <a:r>
-              <a:rPr lang="en-US"/>
-              <a:t>Spring 2021</a:t>
+              <a:rPr lang="en-US" dirty="0" smtClean="0"/>
+              <a:t>Spring/Fall 20XX</a:t>
             </a:r>
             <a:endParaRPr lang="en-US" dirty="0"/>
           </a:p>
@@ -7785,6 +7784,13 @@
   <p:clrMapOvr>
     <a:masterClrMapping/>
   </p:clrMapOvr>
+  <p:timing>
+    <p:tnLst>
+      <p:par>
+        <p:cTn id="1" dur="indefinite" restart="never" nodeType="tmRoot"/>
+      </p:par>
+    </p:tnLst>
+  </p:timing>
 </p:sld>
 </file>
 
@@ -8666,6 +8672,13 @@
   <p:clrMapOvr>
     <a:masterClrMapping/>
   </p:clrMapOvr>
+  <p:timing>
+    <p:tnLst>
+      <p:par>
+        <p:cTn id="1" dur="indefinite" restart="never" nodeType="tmRoot"/>
+      </p:par>
+    </p:tnLst>
+  </p:timing>
 </p:sld>
 </file>
 
@@ -8788,6 +8801,13 @@
   <p:clrMapOvr>
     <a:masterClrMapping/>
   </p:clrMapOvr>
+  <p:timing>
+    <p:tnLst>
+      <p:par>
+        <p:cTn id="1" dur="indefinite" restart="never" nodeType="tmRoot"/>
+      </p:par>
+    </p:tnLst>
+  </p:timing>
 </p:sld>
 </file>
 
@@ -9680,6 +9700,13 @@
   <p:clrMapOvr>
     <a:masterClrMapping/>
   </p:clrMapOvr>
+  <p:timing>
+    <p:tnLst>
+      <p:par>
+        <p:cTn id="1" dur="indefinite" restart="never" nodeType="tmRoot"/>
+      </p:par>
+    </p:tnLst>
+  </p:timing>
 </p:sld>
 </file>
 
@@ -10072,6 +10099,13 @@
   <p:clrMapOvr>
     <a:masterClrMapping/>
   </p:clrMapOvr>
+  <p:timing>
+    <p:tnLst>
+      <p:par>
+        <p:cTn id="1" dur="indefinite" restart="never" nodeType="tmRoot"/>
+      </p:par>
+    </p:tnLst>
+  </p:timing>
 </p:sld>
 </file>
 
@@ -10265,6 +10299,13 @@
   <p:clrMapOvr>
     <a:masterClrMapping/>
   </p:clrMapOvr>
+  <p:timing>
+    <p:tnLst>
+      <p:par>
+        <p:cTn id="1" dur="indefinite" restart="never" nodeType="tmRoot"/>
+      </p:par>
+    </p:tnLst>
+  </p:timing>
 </p:sld>
 </file>
 
@@ -10387,6 +10428,13 @@
   <p:clrMapOvr>
     <a:masterClrMapping/>
   </p:clrMapOvr>
+  <p:timing>
+    <p:tnLst>
+      <p:par>
+        <p:cTn id="1" dur="indefinite" restart="never" nodeType="tmRoot"/>
+      </p:par>
+    </p:tnLst>
+  </p:timing>
 </p:sld>
 </file>
 
@@ -12829,6 +12877,13 @@
   <p:clrMapOvr>
     <a:masterClrMapping/>
   </p:clrMapOvr>
+  <p:timing>
+    <p:tnLst>
+      <p:par>
+        <p:cTn id="1" dur="indefinite" restart="never" nodeType="tmRoot"/>
+      </p:par>
+    </p:tnLst>
+  </p:timing>
 </p:sld>
 </file>
 
@@ -13073,6 +13128,13 @@
   <p:clrMapOvr>
     <a:masterClrMapping/>
   </p:clrMapOvr>
+  <p:timing>
+    <p:tnLst>
+      <p:par>
+        <p:cTn id="1" dur="indefinite" restart="never" nodeType="tmRoot"/>
+      </p:par>
+    </p:tnLst>
+  </p:timing>
 </p:sld>
 </file>
 
@@ -13475,6 +13537,13 @@
   <p:clrMapOvr>
     <a:masterClrMapping/>
   </p:clrMapOvr>
+  <p:timing>
+    <p:tnLst>
+      <p:par>
+        <p:cTn id="1" dur="indefinite" restart="never" nodeType="tmRoot"/>
+      </p:par>
+    </p:tnLst>
+  </p:timing>
 </p:sld>
 </file>
 
@@ -13675,121 +13744,13 @@
   <p:clrMapOvr>
     <a:masterClrMapping/>
   </p:clrMapOvr>
-</p:sld>
-</file>
-
-<file path=ppt/slides/slide23.xml><?xml version="1.0" encoding="utf-8"?>
-<p:sld xmlns:a="http://schemas.openxmlformats.org/drawingml/2006/main" xmlns:r="http://schemas.openxmlformats.org/officeDocument/2006/relationships" xmlns:p="http://schemas.openxmlformats.org/presentationml/2006/main">
-  <p:cSld>
-    <p:spTree>
-      <p:nvGrpSpPr>
-        <p:cNvPr id="1" name=""/>
-        <p:cNvGrpSpPr/>
-        <p:nvPr/>
-      </p:nvGrpSpPr>
-      <p:grpSpPr>
-        <a:xfrm>
-          <a:off x="0" y="0"/>
-          <a:ext cx="0" cy="0"/>
-          <a:chOff x="0" y="0"/>
-          <a:chExt cx="0" cy="0"/>
-        </a:xfrm>
-      </p:grpSpPr>
-      <p:sp>
-        <p:nvSpPr>
-          <p:cNvPr id="2" name="Title 1">
-            <a:extLst>
-              <a:ext uri="{FF2B5EF4-FFF2-40B4-BE49-F238E27FC236}">
-                <a16:creationId xmlns:a16="http://schemas.microsoft.com/office/drawing/2014/main" id="{6DEE9AD7-6F01-418E-B059-BF0117EC3E50}"/>
-              </a:ext>
-            </a:extLst>
-          </p:cNvPr>
-          <p:cNvSpPr>
-            <a:spLocks noGrp="1"/>
-          </p:cNvSpPr>
-          <p:nvPr>
-            <p:ph type="title"/>
-          </p:nvPr>
-        </p:nvSpPr>
-        <p:spPr/>
-        <p:txBody>
-          <a:bodyPr/>
-          <a:lstStyle/>
-          <a:p>
-            <a:r>
-              <a:rPr lang="en-US"/>
-              <a:t>Time for Our First Lab</a:t>
-            </a:r>
-            <a:endParaRPr lang="en-US" dirty="0"/>
-          </a:p>
-        </p:txBody>
-      </p:sp>
-      <p:sp>
-        <p:nvSpPr>
-          <p:cNvPr id="3" name="Content Placeholder 2">
-            <a:extLst>
-              <a:ext uri="{FF2B5EF4-FFF2-40B4-BE49-F238E27FC236}">
-                <a16:creationId xmlns:a16="http://schemas.microsoft.com/office/drawing/2014/main" id="{24C11D3E-0A3A-46DD-9ADA-DBEA62637803}"/>
-              </a:ext>
-            </a:extLst>
-          </p:cNvPr>
-          <p:cNvSpPr>
-            <a:spLocks noGrp="1"/>
-          </p:cNvSpPr>
-          <p:nvPr>
-            <p:ph idx="1"/>
-          </p:nvPr>
-        </p:nvSpPr>
-        <p:spPr/>
-        <p:txBody>
-          <a:bodyPr/>
-          <a:lstStyle/>
-          <a:p>
-            <a:r>
-              <a:rPr lang="en-US" dirty="0"/>
-              <a:t>Allgood Hall E365</a:t>
-            </a:r>
-          </a:p>
-        </p:txBody>
-      </p:sp>
-      <p:sp>
-        <p:nvSpPr>
-          <p:cNvPr id="4" name="Footer Placeholder 3">
-            <a:extLst>
-              <a:ext uri="{FF2B5EF4-FFF2-40B4-BE49-F238E27FC236}">
-                <a16:creationId xmlns:a16="http://schemas.microsoft.com/office/drawing/2014/main" id="{459BE2A9-892D-489E-B2FF-DE684042FE72}"/>
-              </a:ext>
-            </a:extLst>
-          </p:cNvPr>
-          <p:cNvSpPr>
-            <a:spLocks noGrp="1"/>
-          </p:cNvSpPr>
-          <p:nvPr>
-            <p:ph type="ftr" sz="quarter" idx="11"/>
-          </p:nvPr>
-        </p:nvSpPr>
-        <p:spPr/>
-        <p:txBody>
-          <a:bodyPr/>
-          <a:lstStyle/>
-          <a:p>
-            <a:r>
-              <a:rPr lang="en-US"/>
-              <a:t>CSCI 1301</a:t>
-            </a:r>
-          </a:p>
-        </p:txBody>
-      </p:sp>
-    </p:spTree>
-    <p:extLst>
-      <p:ext uri="{BB962C8B-B14F-4D97-AF65-F5344CB8AC3E}">
-        <p14:creationId xmlns:p14="http://schemas.microsoft.com/office/powerpoint/2010/main" val="3520136350"/>
-      </p:ext>
-    </p:extLst>
-  </p:cSld>
-  <p:clrMapOvr>
-    <a:masterClrMapping/>
-  </p:clrMapOvr>
+  <p:timing>
+    <p:tnLst>
+      <p:par>
+        <p:cTn id="1" dur="indefinite" restart="never" nodeType="tmRoot"/>
+      </p:par>
+    </p:tnLst>
+  </p:timing>
 </p:sld>
 </file>
 
@@ -14286,13 +14247,12 @@
           <a:p>
             <a:r>
               <a:rPr lang="en-US" dirty="0"/>
-              <a:t>Programming: Many different languages for instructing computers what to do (i.e. building apps)</a:t>
-            </a:r>
-          </a:p>
-          <a:p>
-            <a:pPr marL="0" indent="0">
-              <a:buNone/>
-            </a:pPr>
+              <a:t>Programming: Many different languages for instructing computers what to </a:t>
+            </a:r>
+            <a:r>
+              <a:rPr lang="en-US" dirty="0" smtClean="0"/>
+              <a:t>do, different tools for different jobs</a:t>
+            </a:r>
             <a:endParaRPr lang="en-US" dirty="0"/>
           </a:p>
         </p:txBody>
@@ -14340,7 +14300,7 @@
           <p:nvPr/>
         </p:nvPicPr>
         <p:blipFill>
-          <a:blip r:embed="rId2">
+          <a:blip r:embed="rId2" cstate="print">
             <a:extLst>
               <a:ext uri="{28A0092B-C50C-407E-A947-70E740481C1C}">
                 <a14:useLocalDpi xmlns:a14="http://schemas.microsoft.com/office/drawing/2010/main" val="0"/>
@@ -14354,8 +14314,8 @@
         </p:blipFill>
         <p:spPr bwMode="auto">
           <a:xfrm>
-            <a:off x="9618663" y="3962400"/>
-            <a:ext cx="1512346" cy="1714578"/>
+            <a:off x="10292749" y="3985709"/>
+            <a:ext cx="1260184" cy="1428697"/>
           </a:xfrm>
           <a:prstGeom prst="rect">
             <a:avLst/>
@@ -14399,7 +14359,7 @@
         </p:blipFill>
         <p:spPr bwMode="auto">
           <a:xfrm>
-            <a:off x="6441262" y="3005137"/>
+            <a:off x="6256428" y="2957452"/>
             <a:ext cx="1276350" cy="1914526"/>
           </a:xfrm>
           <a:prstGeom prst="rect">
@@ -14444,7 +14404,7 @@
         </p:blipFill>
         <p:spPr bwMode="auto">
           <a:xfrm>
-            <a:off x="8304212" y="2773035"/>
+            <a:off x="8268879" y="2620657"/>
             <a:ext cx="3160940" cy="922643"/>
           </a:xfrm>
           <a:prstGeom prst="rect">
@@ -14491,7 +14451,7 @@
         </p:blipFill>
         <p:spPr bwMode="auto">
           <a:xfrm>
-            <a:off x="1883003" y="2703118"/>
+            <a:off x="826038" y="2519750"/>
             <a:ext cx="1729251" cy="1729251"/>
           </a:xfrm>
           <a:prstGeom prst="rect">
@@ -14538,7 +14498,7 @@
         </p:blipFill>
         <p:spPr bwMode="auto">
           <a:xfrm>
-            <a:off x="4383291" y="2773035"/>
+            <a:off x="3752027" y="2487109"/>
             <a:ext cx="1366860" cy="1536516"/>
           </a:xfrm>
           <a:prstGeom prst="rect">
@@ -14585,7 +14545,7 @@
         </p:blipFill>
         <p:spPr bwMode="auto">
           <a:xfrm>
-            <a:off x="1506434" y="4741548"/>
+            <a:off x="884495" y="4770572"/>
             <a:ext cx="1914524" cy="999807"/>
           </a:xfrm>
           <a:prstGeom prst="rect">
@@ -14632,8 +14592,8 @@
         </p:blipFill>
         <p:spPr bwMode="auto">
           <a:xfrm>
-            <a:off x="4251762" y="4619919"/>
-            <a:ext cx="1536516" cy="1536516"/>
+            <a:off x="4265612" y="4868531"/>
+            <a:ext cx="1379498" cy="1379498"/>
           </a:xfrm>
           <a:prstGeom prst="rect">
             <a:avLst/>
@@ -14679,7 +14639,7 @@
         </p:blipFill>
         <p:spPr bwMode="auto">
           <a:xfrm>
-            <a:off x="8049710" y="4114800"/>
+            <a:off x="8299118" y="4084021"/>
             <a:ext cx="1276350" cy="1276350"/>
           </a:xfrm>
           <a:prstGeom prst="rect">
@@ -14697,6 +14657,284 @@
           </a:extLst>
         </p:spPr>
       </p:pic>
+      <p:sp>
+        <p:nvSpPr>
+          <p:cNvPr id="7" name="TextBox 6"/>
+          <p:cNvSpPr txBox="1"/>
+          <p:nvPr/>
+        </p:nvSpPr>
+        <p:spPr>
+          <a:xfrm>
+            <a:off x="840436" y="4161463"/>
+            <a:ext cx="1755609" cy="400110"/>
+          </a:xfrm>
+          <a:prstGeom prst="rect">
+            <a:avLst/>
+          </a:prstGeom>
+          <a:noFill/>
+        </p:spPr>
+        <p:txBody>
+          <a:bodyPr wrap="none" rtlCol="0">
+            <a:spAutoFit/>
+          </a:bodyPr>
+          <a:lstStyle/>
+          <a:p>
+            <a:r>
+              <a:rPr lang="en-US" sz="2000" dirty="0" smtClean="0"/>
+              <a:t>OS and drivers</a:t>
+            </a:r>
+            <a:endParaRPr lang="en-US" sz="2000" dirty="0"/>
+          </a:p>
+        </p:txBody>
+      </p:sp>
+      <p:sp>
+        <p:nvSpPr>
+          <p:cNvPr id="14" name="TextBox 13"/>
+          <p:cNvSpPr txBox="1"/>
+          <p:nvPr/>
+        </p:nvSpPr>
+        <p:spPr>
+          <a:xfrm>
+            <a:off x="3168712" y="3990207"/>
+            <a:ext cx="2766402" cy="707886"/>
+          </a:xfrm>
+          <a:prstGeom prst="rect">
+            <a:avLst/>
+          </a:prstGeom>
+          <a:noFill/>
+        </p:spPr>
+        <p:txBody>
+          <a:bodyPr wrap="square" rtlCol="0">
+            <a:spAutoFit/>
+          </a:bodyPr>
+          <a:lstStyle/>
+          <a:p>
+            <a:pPr algn="ctr"/>
+            <a:r>
+              <a:rPr lang="en-US" sz="2000" dirty="0" smtClean="0"/>
+              <a:t>Graphics, video games, server software</a:t>
+            </a:r>
+            <a:endParaRPr lang="en-US" sz="2000" dirty="0"/>
+          </a:p>
+        </p:txBody>
+      </p:sp>
+      <p:sp>
+        <p:nvSpPr>
+          <p:cNvPr id="8" name="TextBox 7"/>
+          <p:cNvSpPr txBox="1"/>
+          <p:nvPr/>
+        </p:nvSpPr>
+        <p:spPr>
+          <a:xfrm>
+            <a:off x="519294" y="5838678"/>
+            <a:ext cx="2616422" cy="400110"/>
+          </a:xfrm>
+          <a:prstGeom prst="rect">
+            <a:avLst/>
+          </a:prstGeom>
+          <a:noFill/>
+        </p:spPr>
+        <p:txBody>
+          <a:bodyPr wrap="none" rtlCol="0">
+            <a:spAutoFit/>
+          </a:bodyPr>
+          <a:lstStyle/>
+          <a:p>
+            <a:r>
+              <a:rPr lang="en-US" sz="2000" dirty="0" smtClean="0"/>
+              <a:t>Scientific computation</a:t>
+            </a:r>
+            <a:endParaRPr lang="en-US" sz="2000" dirty="0"/>
+          </a:p>
+        </p:txBody>
+      </p:sp>
+      <p:sp>
+        <p:nvSpPr>
+          <p:cNvPr id="9" name="TextBox 8"/>
+          <p:cNvSpPr txBox="1"/>
+          <p:nvPr/>
+        </p:nvSpPr>
+        <p:spPr>
+          <a:xfrm>
+            <a:off x="6045002" y="5284326"/>
+            <a:ext cx="1895475" cy="707886"/>
+          </a:xfrm>
+          <a:prstGeom prst="rect">
+            <a:avLst/>
+          </a:prstGeom>
+          <a:noFill/>
+        </p:spPr>
+        <p:txBody>
+          <a:bodyPr wrap="square" rtlCol="0">
+            <a:spAutoFit/>
+          </a:bodyPr>
+          <a:lstStyle/>
+          <a:p>
+            <a:r>
+              <a:rPr lang="en-US" sz="2000" dirty="0" smtClean="0"/>
+              <a:t>Desktop and web apps</a:t>
+            </a:r>
+            <a:endParaRPr lang="en-US" sz="2000" dirty="0"/>
+          </a:p>
+        </p:txBody>
+      </p:sp>
+      <p:sp>
+        <p:nvSpPr>
+          <p:cNvPr id="10" name="TextBox 9"/>
+          <p:cNvSpPr txBox="1"/>
+          <p:nvPr/>
+        </p:nvSpPr>
+        <p:spPr>
+          <a:xfrm>
+            <a:off x="10220115" y="5479771"/>
+            <a:ext cx="1405451" cy="707886"/>
+          </a:xfrm>
+          <a:prstGeom prst="rect">
+            <a:avLst/>
+          </a:prstGeom>
+          <a:noFill/>
+        </p:spPr>
+        <p:txBody>
+          <a:bodyPr wrap="square" rtlCol="0">
+            <a:spAutoFit/>
+          </a:bodyPr>
+          <a:lstStyle/>
+          <a:p>
+            <a:r>
+              <a:rPr lang="en-US" sz="2000" dirty="0" smtClean="0"/>
+              <a:t>Interactive web pages</a:t>
+            </a:r>
+            <a:endParaRPr lang="en-US" sz="2000" dirty="0"/>
+          </a:p>
+        </p:txBody>
+      </p:sp>
+      <p:sp>
+        <p:nvSpPr>
+          <p:cNvPr id="11" name="TextBox 10"/>
+          <p:cNvSpPr txBox="1"/>
+          <p:nvPr/>
+        </p:nvSpPr>
+        <p:spPr>
+          <a:xfrm>
+            <a:off x="9228368" y="3514605"/>
+            <a:ext cx="1146468" cy="400110"/>
+          </a:xfrm>
+          <a:prstGeom prst="rect">
+            <a:avLst/>
+          </a:prstGeom>
+          <a:noFill/>
+        </p:spPr>
+        <p:txBody>
+          <a:bodyPr wrap="none" rtlCol="0">
+            <a:spAutoFit/>
+          </a:bodyPr>
+          <a:lstStyle/>
+          <a:p>
+            <a:r>
+              <a:rPr lang="en-US" sz="2000" dirty="0" smtClean="0"/>
+              <a:t>Scripting</a:t>
+            </a:r>
+            <a:endParaRPr lang="en-US" sz="2000" dirty="0"/>
+          </a:p>
+        </p:txBody>
+      </p:sp>
+      <p:sp>
+        <p:nvSpPr>
+          <p:cNvPr id="19" name="TextBox 18"/>
+          <p:cNvSpPr txBox="1"/>
+          <p:nvPr/>
+        </p:nvSpPr>
+        <p:spPr>
+          <a:xfrm>
+            <a:off x="8149332" y="5400093"/>
+            <a:ext cx="1405451" cy="707886"/>
+          </a:xfrm>
+          <a:prstGeom prst="rect">
+            <a:avLst/>
+          </a:prstGeom>
+          <a:noFill/>
+        </p:spPr>
+        <p:txBody>
+          <a:bodyPr wrap="square" rtlCol="0">
+            <a:spAutoFit/>
+          </a:bodyPr>
+          <a:lstStyle/>
+          <a:p>
+            <a:pPr algn="ctr"/>
+            <a:r>
+              <a:rPr lang="en-US" sz="2000" dirty="0" smtClean="0"/>
+              <a:t>New server software</a:t>
+            </a:r>
+            <a:endParaRPr lang="en-US" sz="2000" dirty="0"/>
+          </a:p>
+        </p:txBody>
+      </p:sp>
+      <p:cxnSp>
+        <p:nvCxnSpPr>
+          <p:cNvPr id="13" name="Straight Arrow Connector 12"/>
+          <p:cNvCxnSpPr/>
+          <p:nvPr/>
+        </p:nvCxnSpPr>
+        <p:spPr>
+          <a:xfrm flipV="1">
+            <a:off x="6627812" y="4921219"/>
+            <a:ext cx="16179" cy="363107"/>
+          </a:xfrm>
+          <a:prstGeom prst="straightConnector1">
+            <a:avLst/>
+          </a:prstGeom>
+          <a:ln>
+            <a:tailEnd type="triangle"/>
+          </a:ln>
+        </p:spPr>
+        <p:style>
+          <a:lnRef idx="2">
+            <a:schemeClr val="accent1"/>
+          </a:lnRef>
+          <a:fillRef idx="0">
+            <a:schemeClr val="accent1"/>
+          </a:fillRef>
+          <a:effectRef idx="1">
+            <a:schemeClr val="accent1"/>
+          </a:effectRef>
+          <a:fontRef idx="minor">
+            <a:schemeClr val="tx1"/>
+          </a:fontRef>
+        </p:style>
+      </p:cxnSp>
+      <p:cxnSp>
+        <p:nvCxnSpPr>
+          <p:cNvPr id="16" name="Straight Arrow Connector 15"/>
+          <p:cNvCxnSpPr/>
+          <p:nvPr/>
+        </p:nvCxnSpPr>
+        <p:spPr>
+          <a:xfrm flipH="1" flipV="1">
+            <a:off x="5720655" y="5479771"/>
+            <a:ext cx="324347" cy="82829"/>
+          </a:xfrm>
+          <a:prstGeom prst="straightConnector1">
+            <a:avLst/>
+          </a:prstGeom>
+          <a:ln>
+            <a:tailEnd type="triangle"/>
+          </a:ln>
+        </p:spPr>
+        <p:style>
+          <a:lnRef idx="2">
+            <a:schemeClr val="accent1"/>
+          </a:lnRef>
+          <a:fillRef idx="0">
+            <a:schemeClr val="accent1"/>
+          </a:fillRef>
+          <a:effectRef idx="1">
+            <a:schemeClr val="accent1"/>
+          </a:effectRef>
+          <a:fontRef idx="minor">
+            <a:schemeClr val="tx1"/>
+          </a:fontRef>
+        </p:style>
+      </p:cxnSp>
     </p:spTree>
     <p:extLst>
       <p:ext uri="{BB962C8B-B14F-4D97-AF65-F5344CB8AC3E}">
@@ -16313,9 +16551,18 @@
           <a:lstStyle/>
           <a:p>
             <a:r>
+              <a:rPr lang="en-US" dirty="0" smtClean="0"/>
+              <a:t>Much </a:t>
+            </a:r>
+            <a:r>
               <a:rPr lang="en-US" dirty="0"/>
-              <a:t>More human-readable language for programs</a:t>
-            </a:r>
+              <a:t>m</a:t>
+            </a:r>
+            <a:r>
+              <a:rPr lang="en-US" dirty="0" smtClean="0"/>
+              <a:t>ore human-readable</a:t>
+            </a:r>
+            <a:endParaRPr lang="en-US" dirty="0"/>
           </a:p>
           <a:p>
             <a:r>
@@ -16334,10 +16581,31 @@
             </a:r>
           </a:p>
           <a:p>
+            <a:pPr lvl="1"/>
             <a:r>
               <a:rPr lang="en-US" dirty="0"/>
-              <a:t>Each high-level language needs its own compiler</a:t>
-            </a:r>
+              <a:t>Each high-level </a:t>
+            </a:r>
+            <a:r>
+              <a:rPr lang="en-US" dirty="0" smtClean="0"/>
+              <a:t>language and target machine </a:t>
+            </a:r>
+            <a:r>
+              <a:rPr lang="en-US" dirty="0"/>
+              <a:t>needs its own </a:t>
+            </a:r>
+            <a:r>
+              <a:rPr lang="en-US" dirty="0" smtClean="0"/>
+              <a:t>compiler</a:t>
+            </a:r>
+          </a:p>
+          <a:p>
+            <a:pPr lvl="1"/>
+            <a:r>
+              <a:rPr lang="en-US" dirty="0" smtClean="0"/>
+              <a:t>Incorporates code libraries</a:t>
+            </a:r>
+            <a:endParaRPr lang="en-US" dirty="0"/>
           </a:p>
           <a:p>
             <a:r>
@@ -16900,6 +17168,55 @@
                                           <p:spTgt spid="6">
                                             <p:txEl>
                                               <p:pRg st="4" end="4"/>
+                                            </p:txEl>
+                                          </p:spTgt>
+                                        </p:tgtEl>
+                                        <p:attrNameLst>
+                                          <p:attrName>style.visibility</p:attrName>
+                                        </p:attrNameLst>
+                                      </p:cBhvr>
+                                      <p:to>
+                                        <p:strVal val="visible"/>
+                                      </p:to>
+                                    </p:set>
+                                  </p:childTnLst>
+                                </p:cTn>
+                              </p:par>
+                            </p:childTnLst>
+                          </p:cTn>
+                        </p:par>
+                      </p:childTnLst>
+                    </p:cTn>
+                  </p:par>
+                  <p:par>
+                    <p:cTn id="11" fill="hold">
+                      <p:stCondLst>
+                        <p:cond delay="indefinite"/>
+                      </p:stCondLst>
+                      <p:childTnLst>
+                        <p:par>
+                          <p:cTn id="12" fill="hold">
+                            <p:stCondLst>
+                              <p:cond delay="0"/>
+                            </p:stCondLst>
+                            <p:childTnLst>
+                              <p:par>
+                                <p:cTn id="13" presetID="1" presetClass="entr" presetSubtype="0" fill="hold" nodeType="clickEffect">
+                                  <p:stCondLst>
+                                    <p:cond delay="0"/>
+                                  </p:stCondLst>
+                                  <p:childTnLst>
+                                    <p:set>
+                                      <p:cBhvr>
+                                        <p:cTn id="14" dur="1" fill="hold">
+                                          <p:stCondLst>
+                                            <p:cond delay="0"/>
+                                          </p:stCondLst>
+                                        </p:cTn>
+                                        <p:tgtEl>
+                                          <p:spTgt spid="6">
+                                            <p:txEl>
+                                              <p:pRg st="5" end="5"/>
                                             </p:txEl>
                                           </p:spTgt>
                                         </p:tgtEl>

</xml_diff>